<commit_message>
Start of German version
</commit_message>
<xml_diff>
--- a/presentation.pptx
+++ b/presentation.pptx
@@ -9,7 +9,7 @@
   </p:notesMasterIdLst>
   <p:sldIdLst>
     <p:sldId id="278" r:id="rId2"/>
-    <p:sldId id="268" r:id="rId3"/>
+    <p:sldId id="398" r:id="rId3"/>
     <p:sldId id="342" r:id="rId4"/>
     <p:sldId id="343" r:id="rId5"/>
     <p:sldId id="344" r:id="rId6"/>
@@ -68,7 +68,7 @@
     <p:sldId id="384" r:id="rId59"/>
     <p:sldId id="267" r:id="rId60"/>
     <p:sldId id="275" r:id="rId61"/>
-    <p:sldId id="279" r:id="rId62"/>
+    <p:sldId id="399" r:id="rId62"/>
   </p:sldIdLst>
   <p:sldSz cx="12192000" cy="6858000"/>
   <p:notesSz cx="6858000" cy="9144000"/>
@@ -173,7 +173,7 @@
         <p14:section name="Default Section" id="{E00AF5C8-00D9-4AE2-95E5-E66505DF4034}">
           <p14:sldIdLst>
             <p14:sldId id="278"/>
-            <p14:sldId id="268"/>
+            <p14:sldId id="398"/>
             <p14:sldId id="342"/>
             <p14:sldId id="343"/>
             <p14:sldId id="344"/>
@@ -240,7 +240,7 @@
           <p14:sldIdLst>
             <p14:sldId id="267"/>
             <p14:sldId id="275"/>
-            <p14:sldId id="279"/>
+            <p14:sldId id="399"/>
           </p14:sldIdLst>
         </p14:section>
       </p14:sectionLst>
@@ -341,7 +341,7 @@
           <a:p>
             <a:fld id="{D987070D-87AF-4443-8990-425EA27CC244}" type="datetimeFigureOut">
               <a:rPr lang="de-CH" smtClean="0"/>
-              <a:t>02.05.2017</a:t>
+              <a:t>03.05.2017</a:t>
             </a:fld>
             <a:endParaRPr lang="de-CH"/>
           </a:p>
@@ -2757,15 +2757,6 @@
           <a:p>
             <a:r>
               <a:rPr lang="en-US" dirty="0"/>
-              <a:t>I’m Daniel, I’m an engineer working for Particular Software. In Particular we build</a:t>
-            </a:r>
-          </a:p>
-          <a:p>
-            <a:endParaRPr lang="en-US" dirty="0"/>
-          </a:p>
-          <a:p>
-            <a:r>
-              <a:rPr lang="en-US" dirty="0"/>
               <a:t>4 «products» and a Platform for over 1000 customers world wide being used by tens of thousands developers</a:t>
             </a:r>
           </a:p>
@@ -2833,9 +2824,6 @@
             </a:r>
             <a:endParaRPr lang="de-CH" dirty="0"/>
           </a:p>
-          <a:p>
-            <a:endParaRPr lang="de-CH" dirty="0"/>
-          </a:p>
         </p:txBody>
       </p:sp>
       <p:sp>
@@ -2864,7 +2852,7 @@
     </p:spTree>
     <p:extLst>
       <p:ext uri="{BB962C8B-B14F-4D97-AF65-F5344CB8AC3E}">
-        <p14:creationId xmlns:p14="http://schemas.microsoft.com/office/powerpoint/2010/main" val="88145516"/>
+        <p14:creationId xmlns:p14="http://schemas.microsoft.com/office/powerpoint/2010/main" val="3386958012"/>
       </p:ext>
     </p:extLst>
   </p:cSld>
@@ -9064,14 +9052,9 @@
           <a:bodyPr/>
           <a:lstStyle/>
           <a:p>
-            <a:r>
-              <a:rPr lang="de-CH" dirty="0"/>
-              <a:t>Thank you very much</a:t>
-            </a:r>
-            <a:r>
-              <a:rPr lang="de-CH" baseline="0" dirty="0"/>
-              <a:t> for listening and see you next time</a:t>
-            </a:r>
+            <a:endParaRPr lang="en-US" dirty="0"/>
+          </a:p>
+          <a:p>
             <a:endParaRPr lang="de-CH" dirty="0"/>
           </a:p>
         </p:txBody>
@@ -9102,7 +9085,7 @@
     </p:spTree>
     <p:extLst>
       <p:ext uri="{BB962C8B-B14F-4D97-AF65-F5344CB8AC3E}">
-        <p14:creationId xmlns:p14="http://schemas.microsoft.com/office/powerpoint/2010/main" val="3949593976"/>
+        <p14:creationId xmlns:p14="http://schemas.microsoft.com/office/powerpoint/2010/main" val="268487331"/>
       </p:ext>
     </p:extLst>
   </p:cSld>
@@ -9605,7 +9588,7 @@
           <a:p>
             <a:fld id="{A2EAEABE-1D59-4413-813E-803E21872067}" type="datetimeFigureOut">
               <a:rPr lang="de-CH" smtClean="0"/>
-              <a:t>02.05.2017</a:t>
+              <a:t>03.05.2017</a:t>
             </a:fld>
             <a:endParaRPr lang="de-CH"/>
           </a:p>
@@ -9775,7 +9758,7 @@
           <a:p>
             <a:fld id="{A2EAEABE-1D59-4413-813E-803E21872067}" type="datetimeFigureOut">
               <a:rPr lang="de-CH" smtClean="0"/>
-              <a:t>02.05.2017</a:t>
+              <a:t>03.05.2017</a:t>
             </a:fld>
             <a:endParaRPr lang="de-CH"/>
           </a:p>
@@ -9955,7 +9938,7 @@
           <a:p>
             <a:fld id="{A2EAEABE-1D59-4413-813E-803E21872067}" type="datetimeFigureOut">
               <a:rPr lang="de-CH" smtClean="0"/>
-              <a:t>02.05.2017</a:t>
+              <a:t>03.05.2017</a:t>
             </a:fld>
             <a:endParaRPr lang="de-CH"/>
           </a:p>
@@ -10124,7 +10107,7 @@
           <a:p>
             <a:fld id="{A2EAEABE-1D59-4413-813E-803E21872067}" type="datetimeFigureOut">
               <a:rPr lang="de-CH" smtClean="0"/>
-              <a:t>02.05.2017</a:t>
+              <a:t>03.05.2017</a:t>
             </a:fld>
             <a:endParaRPr lang="de-CH"/>
           </a:p>
@@ -10370,7 +10353,7 @@
           <a:p>
             <a:fld id="{A2EAEABE-1D59-4413-813E-803E21872067}" type="datetimeFigureOut">
               <a:rPr lang="de-CH" smtClean="0"/>
-              <a:t>02.05.2017</a:t>
+              <a:t>03.05.2017</a:t>
             </a:fld>
             <a:endParaRPr lang="de-CH"/>
           </a:p>
@@ -10602,7 +10585,7 @@
           <a:p>
             <a:fld id="{A2EAEABE-1D59-4413-813E-803E21872067}" type="datetimeFigureOut">
               <a:rPr lang="de-CH" smtClean="0"/>
-              <a:t>02.05.2017</a:t>
+              <a:t>03.05.2017</a:t>
             </a:fld>
             <a:endParaRPr lang="de-CH"/>
           </a:p>
@@ -10969,7 +10952,7 @@
           <a:p>
             <a:fld id="{A2EAEABE-1D59-4413-813E-803E21872067}" type="datetimeFigureOut">
               <a:rPr lang="de-CH" smtClean="0"/>
-              <a:t>02.05.2017</a:t>
+              <a:t>03.05.2017</a:t>
             </a:fld>
             <a:endParaRPr lang="de-CH"/>
           </a:p>
@@ -11087,7 +11070,7 @@
           <a:p>
             <a:fld id="{A2EAEABE-1D59-4413-813E-803E21872067}" type="datetimeFigureOut">
               <a:rPr lang="de-CH" smtClean="0"/>
-              <a:t>02.05.2017</a:t>
+              <a:t>03.05.2017</a:t>
             </a:fld>
             <a:endParaRPr lang="de-CH"/>
           </a:p>
@@ -11182,7 +11165,7 @@
           <a:p>
             <a:fld id="{A2EAEABE-1D59-4413-813E-803E21872067}" type="datetimeFigureOut">
               <a:rPr lang="de-CH" smtClean="0"/>
-              <a:t>02.05.2017</a:t>
+              <a:t>03.05.2017</a:t>
             </a:fld>
             <a:endParaRPr lang="de-CH"/>
           </a:p>
@@ -11459,7 +11442,7 @@
           <a:p>
             <a:fld id="{A2EAEABE-1D59-4413-813E-803E21872067}" type="datetimeFigureOut">
               <a:rPr lang="de-CH" smtClean="0"/>
-              <a:t>02.05.2017</a:t>
+              <a:t>03.05.2017</a:t>
             </a:fld>
             <a:endParaRPr lang="de-CH"/>
           </a:p>
@@ -11716,7 +11699,7 @@
           <a:p>
             <a:fld id="{A2EAEABE-1D59-4413-813E-803E21872067}" type="datetimeFigureOut">
               <a:rPr lang="de-CH" smtClean="0"/>
-              <a:t>02.05.2017</a:t>
+              <a:t>03.05.2017</a:t>
             </a:fld>
             <a:endParaRPr lang="de-CH"/>
           </a:p>
@@ -11927,7 +11910,7 @@
           <a:p>
             <a:fld id="{A2EAEABE-1D59-4413-813E-803E21872067}" type="datetimeFigureOut">
               <a:rPr lang="de-CH" smtClean="0"/>
-              <a:t>02.05.2017</a:t>
+              <a:t>03.05.2017</a:t>
             </a:fld>
             <a:endParaRPr lang="de-CH"/>
           </a:p>
@@ -14264,161 +14247,296 @@
           <a:chExt cx="0" cy="0"/>
         </a:xfrm>
       </p:grpSpPr>
+      <p:sp>
+        <p:nvSpPr>
+          <p:cNvPr id="3" name="Rectangle 2"/>
+          <p:cNvSpPr/>
+          <p:nvPr/>
+        </p:nvSpPr>
+        <p:spPr>
+          <a:xfrm>
+            <a:off x="61472" y="6385432"/>
+            <a:ext cx="2480166" cy="461665"/>
+          </a:xfrm>
+          <a:prstGeom prst="rect">
+            <a:avLst/>
+          </a:prstGeom>
+        </p:spPr>
+        <p:txBody>
+          <a:bodyPr wrap="none">
+            <a:spAutoFit/>
+          </a:bodyPr>
+          <a:lstStyle/>
+          <a:p>
+            <a:r>
+              <a:rPr lang="en-US" sz="2400" dirty="0">
+                <a:solidFill>
+                  <a:schemeClr val="accent3"/>
+                </a:solidFill>
+                <a:latin typeface="Yanone Kaffeesatz Regular" panose="02000000000000000000" pitchFamily="2" charset="0"/>
+              </a:rPr>
+              <a:t>https://teamtime.zone/</a:t>
+            </a:r>
+          </a:p>
+        </p:txBody>
+      </p:sp>
       <p:pic>
         <p:nvPicPr>
-          <p:cNvPr id="3" name="Picture 2"/>
+          <p:cNvPr id="11" name="Picture 10"/>
           <p:cNvPicPr>
             <a:picLocks noChangeAspect="1"/>
           </p:cNvPicPr>
           <p:nvPr/>
         </p:nvPicPr>
-        <p:blipFill>
-          <a:blip r:embed="rId3" cstate="print">
-            <a:extLst>
-              <a:ext uri="{28A0092B-C50C-407E-A947-70E740481C1C}">
-                <a14:useLocalDpi xmlns:a14="http://schemas.microsoft.com/office/drawing/2010/main" val="0"/>
-              </a:ext>
-            </a:extLst>
-          </a:blip>
-          <a:stretch>
-            <a:fillRect/>
-          </a:stretch>
+        <p:blipFill rotWithShape="1">
+          <a:blip r:embed="rId3"/>
+          <a:srcRect r="672"/>
+          <a:stretch/>
         </p:blipFill>
         <p:spPr>
           <a:xfrm>
-            <a:off x="8052306" y="612519"/>
-            <a:ext cx="2880000" cy="690817"/>
+            <a:off x="0" y="0"/>
+            <a:ext cx="12203111" cy="6293224"/>
           </a:xfrm>
           <a:prstGeom prst="rect">
             <a:avLst/>
           </a:prstGeom>
         </p:spPr>
       </p:pic>
-      <p:sp>
-        <p:nvSpPr>
-          <p:cNvPr id="2" name="Rectangle 1"/>
-          <p:cNvSpPr/>
+      <p:grpSp>
+        <p:nvGrpSpPr>
+          <p:cNvPr id="18" name="Group 17"/>
+          <p:cNvGrpSpPr/>
           <p:nvPr/>
-        </p:nvSpPr>
-        <p:spPr>
+        </p:nvGrpSpPr>
+        <p:grpSpPr>
           <a:xfrm>
-            <a:off x="5723694" y="2132715"/>
-            <a:ext cx="6096000" cy="2677656"/>
+            <a:off x="4879361" y="4433293"/>
+            <a:ext cx="2827725" cy="1091527"/>
+            <a:chOff x="4879361" y="4433293"/>
+            <a:chExt cx="2827725" cy="1091527"/>
           </a:xfrm>
-          <a:prstGeom prst="rect">
-            <a:avLst/>
-          </a:prstGeom>
-        </p:spPr>
-        <p:txBody>
-          <a:bodyPr>
-            <a:spAutoFit/>
-          </a:bodyPr>
-          <a:lstStyle/>
-          <a:p>
-            <a:r>
-              <a:rPr lang="en-US" sz="2800" dirty="0">
-                <a:solidFill>
-                  <a:schemeClr val="tx2"/>
-                </a:solidFill>
-                <a:latin typeface="Yanone Kaffeesatz Regular" panose="02000000000000000000" pitchFamily="2" charset="0"/>
-              </a:rPr>
-              <a:t>Software Engineer</a:t>
-            </a:r>
-          </a:p>
-          <a:p>
-            <a:r>
-              <a:rPr lang="en-US" sz="2800" dirty="0">
-                <a:solidFill>
-                  <a:schemeClr val="tx2"/>
-                </a:solidFill>
-                <a:latin typeface="Yanone Kaffeesatz Regular" panose="02000000000000000000" pitchFamily="2" charset="0"/>
-              </a:rPr>
-              <a:t>Microsoft Azure MVP</a:t>
-            </a:r>
-          </a:p>
-          <a:p>
-            <a:endParaRPr lang="en-US" sz="2800" dirty="0">
+        </p:grpSpPr>
+        <p:cxnSp>
+          <p:nvCxnSpPr>
+            <p:cNvPr id="13" name="Straight Arrow Connector 12"/>
+            <p:cNvCxnSpPr>
+              <a:cxnSpLocks/>
+            </p:cNvCxnSpPr>
+            <p:nvPr/>
+          </p:nvCxnSpPr>
+          <p:spPr>
+            <a:xfrm>
+              <a:off x="4879361" y="5048410"/>
+              <a:ext cx="1944061" cy="0"/>
+            </a:xfrm>
+            <a:prstGeom prst="straightConnector1">
+              <a:avLst/>
+            </a:prstGeom>
+            <a:ln w="19050">
               <a:solidFill>
                 <a:schemeClr val="tx2"/>
               </a:solidFill>
-              <a:latin typeface="Yanone Kaffeesatz Regular" panose="02000000000000000000" pitchFamily="2" charset="0"/>
-            </a:endParaRPr>
-          </a:p>
-          <a:p>
-            <a:r>
-              <a:rPr lang="en-US" sz="2800" dirty="0">
-                <a:solidFill>
-                  <a:schemeClr val="accent4"/>
+              <a:tailEnd type="triangle"/>
+            </a:ln>
+          </p:spPr>
+          <p:style>
+            <a:lnRef idx="1">
+              <a:schemeClr val="accent1"/>
+            </a:lnRef>
+            <a:fillRef idx="0">
+              <a:schemeClr val="accent1"/>
+            </a:fillRef>
+            <a:effectRef idx="0">
+              <a:schemeClr val="accent1"/>
+            </a:effectRef>
+            <a:fontRef idx="minor">
+              <a:schemeClr val="tx1"/>
+            </a:fontRef>
+          </p:style>
+        </p:cxnSp>
+        <p:sp>
+          <p:nvSpPr>
+            <p:cNvPr id="15" name="Rectangle 14"/>
+            <p:cNvSpPr/>
+            <p:nvPr/>
+          </p:nvSpPr>
+          <p:spPr>
+            <a:xfrm>
+              <a:off x="6823422" y="4725681"/>
+              <a:ext cx="883664" cy="799139"/>
+            </a:xfrm>
+            <a:prstGeom prst="rect">
+              <a:avLst/>
+            </a:prstGeom>
+            <a:noFill/>
+            <a:ln>
+              <a:solidFill>
+                <a:schemeClr val="tx2"/>
+              </a:solidFill>
+            </a:ln>
+          </p:spPr>
+          <p:style>
+            <a:lnRef idx="2">
+              <a:schemeClr val="accent1">
+                <a:shade val="50000"/>
+              </a:schemeClr>
+            </a:lnRef>
+            <a:fillRef idx="1">
+              <a:schemeClr val="accent1"/>
+            </a:fillRef>
+            <a:effectRef idx="0">
+              <a:schemeClr val="accent1"/>
+            </a:effectRef>
+            <a:fontRef idx="minor">
+              <a:schemeClr val="lt1"/>
+            </a:fontRef>
+          </p:style>
+          <p:txBody>
+            <a:bodyPr rtlCol="0" anchor="ctr"/>
+            <a:lstStyle/>
+            <a:p>
+              <a:pPr algn="ctr"/>
+              <a:endParaRPr lang="de-CH"/>
+            </a:p>
+          </p:txBody>
+        </p:sp>
+        <p:sp>
+          <p:nvSpPr>
+            <p:cNvPr id="16" name="TextBox 15"/>
+            <p:cNvSpPr txBox="1"/>
+            <p:nvPr/>
+          </p:nvSpPr>
+          <p:spPr>
+            <a:xfrm>
+              <a:off x="5000487" y="4433293"/>
+              <a:ext cx="1822935" cy="584775"/>
+            </a:xfrm>
+            <a:prstGeom prst="rect">
+              <a:avLst/>
+            </a:prstGeom>
+            <a:noFill/>
+          </p:spPr>
+          <p:txBody>
+            <a:bodyPr wrap="none" rtlCol="0">
+              <a:spAutoFit/>
+            </a:bodyPr>
+            <a:lstStyle/>
+            <a:p>
+              <a:r>
+                <a:rPr lang="en-US" sz="3200" dirty="0">
+                  <a:solidFill>
+                    <a:schemeClr val="accent2"/>
+                  </a:solidFill>
+                  <a:latin typeface="Yanone Kaffeesatz Regular" panose="02000000000000000000" pitchFamily="2" charset="0"/>
+                </a:rPr>
+                <a:t>That’s me </a:t>
+              </a:r>
+              <a:r>
+                <a:rPr lang="en-US" sz="3200" dirty="0">
+                  <a:solidFill>
+                    <a:schemeClr val="accent2"/>
+                  </a:solidFill>
+                  <a:latin typeface="Yanone Kaffeesatz Regular" panose="02000000000000000000" pitchFamily="2" charset="0"/>
+                  <a:sym typeface="Wingdings" panose="05000000000000000000" pitchFamily="2" charset="2"/>
+                </a:rPr>
+                <a:t></a:t>
+              </a:r>
+              <a:endParaRPr lang="de-CH" sz="3200" dirty="0">
+                <a:solidFill>
+                  <a:schemeClr val="accent2"/>
                 </a:solidFill>
                 <a:latin typeface="Yanone Kaffeesatz Regular" panose="02000000000000000000" pitchFamily="2" charset="0"/>
-              </a:rPr>
-              <a:t>@danielmarbach</a:t>
-            </a:r>
-          </a:p>
-          <a:p>
-            <a:r>
-              <a:rPr lang="en-US" sz="2800" dirty="0">
-                <a:solidFill>
-                  <a:schemeClr val="accent4"/>
-                </a:solidFill>
-                <a:latin typeface="Yanone Kaffeesatz Regular" panose="02000000000000000000" pitchFamily="2" charset="0"/>
-              </a:rPr>
-              <a:t>particular.net/blog</a:t>
-            </a:r>
-          </a:p>
-          <a:p>
-            <a:r>
-              <a:rPr lang="en-US" sz="2800" dirty="0">
-                <a:solidFill>
-                  <a:schemeClr val="accent4"/>
-                </a:solidFill>
-                <a:latin typeface="Yanone Kaffeesatz Regular" panose="02000000000000000000" pitchFamily="2" charset="0"/>
-              </a:rPr>
-              <a:t>planetgeek.ch</a:t>
-            </a:r>
-          </a:p>
-        </p:txBody>
-      </p:sp>
-      <p:pic>
-        <p:nvPicPr>
-          <p:cNvPr id="6" name="Picture 5"/>
-          <p:cNvPicPr>
-            <a:picLocks noChangeAspect="1"/>
-          </p:cNvPicPr>
-          <p:nvPr/>
-        </p:nvPicPr>
-        <p:blipFill>
-          <a:blip r:embed="rId4" cstate="print">
-            <a:extLst>
-              <a:ext uri="{28A0092B-C50C-407E-A947-70E740481C1C}">
-                <a14:useLocalDpi xmlns:a14="http://schemas.microsoft.com/office/drawing/2010/main" val="0"/>
-              </a:ext>
-            </a:extLst>
-          </a:blip>
-          <a:stretch>
-            <a:fillRect/>
-          </a:stretch>
-        </p:blipFill>
-        <p:spPr>
-          <a:xfrm rot="16200000">
-            <a:off x="452437" y="1899918"/>
-            <a:ext cx="4714875" cy="3143250"/>
-          </a:xfrm>
-          <a:prstGeom prst="rect">
-            <a:avLst/>
-          </a:prstGeom>
-        </p:spPr>
-      </p:pic>
+              </a:endParaRPr>
+            </a:p>
+          </p:txBody>
+        </p:sp>
+      </p:grpSp>
     </p:spTree>
     <p:extLst>
       <p:ext uri="{BB962C8B-B14F-4D97-AF65-F5344CB8AC3E}">
-        <p14:creationId xmlns:p14="http://schemas.microsoft.com/office/powerpoint/2010/main" val="3601279917"/>
+        <p14:creationId xmlns:p14="http://schemas.microsoft.com/office/powerpoint/2010/main" val="3319303197"/>
       </p:ext>
     </p:extLst>
   </p:cSld>
   <p:clrMapOvr>
     <a:masterClrMapping/>
   </p:clrMapOvr>
+  <p:timing>
+    <p:tnLst>
+      <p:par>
+        <p:cTn id="1" dur="indefinite" restart="never" nodeType="tmRoot">
+          <p:childTnLst>
+            <p:seq concurrent="1" nextAc="seek">
+              <p:cTn id="2" dur="indefinite" nodeType="mainSeq">
+                <p:childTnLst>
+                  <p:par>
+                    <p:cTn id="3" fill="hold">
+                      <p:stCondLst>
+                        <p:cond delay="indefinite"/>
+                      </p:stCondLst>
+                      <p:childTnLst>
+                        <p:par>
+                          <p:cTn id="4" fill="hold">
+                            <p:stCondLst>
+                              <p:cond delay="0"/>
+                            </p:stCondLst>
+                            <p:childTnLst>
+                              <p:par>
+                                <p:cTn id="5" presetID="1" presetClass="entr" presetSubtype="0" fill="hold" nodeType="clickEffect">
+                                  <p:stCondLst>
+                                    <p:cond delay="0"/>
+                                  </p:stCondLst>
+                                  <p:childTnLst>
+                                    <p:set>
+                                      <p:cBhvr>
+                                        <p:cTn id="6" dur="1" fill="hold">
+                                          <p:stCondLst>
+                                            <p:cond delay="0"/>
+                                          </p:stCondLst>
+                                        </p:cTn>
+                                        <p:tgtEl>
+                                          <p:spTgt spid="18"/>
+                                        </p:tgtEl>
+                                        <p:attrNameLst>
+                                          <p:attrName>style.visibility</p:attrName>
+                                        </p:attrNameLst>
+                                      </p:cBhvr>
+                                      <p:to>
+                                        <p:strVal val="visible"/>
+                                      </p:to>
+                                    </p:set>
+                                  </p:childTnLst>
+                                </p:cTn>
+                              </p:par>
+                            </p:childTnLst>
+                          </p:cTn>
+                        </p:par>
+                      </p:childTnLst>
+                    </p:cTn>
+                  </p:par>
+                </p:childTnLst>
+              </p:cTn>
+              <p:prevCondLst>
+                <p:cond evt="onPrev" delay="0">
+                  <p:tgtEl>
+                    <p:sldTgt/>
+                  </p:tgtEl>
+                </p:cond>
+              </p:prevCondLst>
+              <p:nextCondLst>
+                <p:cond evt="onNext" delay="0">
+                  <p:tgtEl>
+                    <p:sldTgt/>
+                  </p:tgtEl>
+                </p:cond>
+              </p:nextCondLst>
+            </p:seq>
+          </p:childTnLst>
+        </p:cTn>
+      </p:par>
+    </p:tnLst>
+  </p:timing>
 </p:sld>
 </file>
 
@@ -19394,40 +19512,6 @@
           <a:chExt cx="0" cy="0"/>
         </a:xfrm>
       </p:grpSpPr>
-      <p:sp>
-        <p:nvSpPr>
-          <p:cNvPr id="2" name="Rectangle 1"/>
-          <p:cNvSpPr/>
-          <p:nvPr/>
-        </p:nvSpPr>
-        <p:spPr>
-          <a:xfrm>
-            <a:off x="3176771" y="1851645"/>
-            <a:ext cx="5838458" cy="3154710"/>
-          </a:xfrm>
-          <a:prstGeom prst="rect">
-            <a:avLst/>
-          </a:prstGeom>
-        </p:spPr>
-        <p:txBody>
-          <a:bodyPr wrap="none">
-            <a:spAutoFit/>
-          </a:bodyPr>
-          <a:lstStyle/>
-          <a:p>
-            <a:r>
-              <a:rPr lang="en-US" sz="19900" dirty="0">
-                <a:solidFill>
-                  <a:schemeClr val="accent2"/>
-                </a:solidFill>
-                <a:latin typeface="Yanone Kaffeesatz Regular" panose="02000000000000000000" pitchFamily="2" charset="0"/>
-              </a:rPr>
-              <a:t>Thanks</a:t>
-            </a:r>
-            <a:endParaRPr lang="de-CH" sz="2000" dirty="0"/>
-          </a:p>
-        </p:txBody>
-      </p:sp>
       <p:pic>
         <p:nvPicPr>
           <p:cNvPr id="3" name="Picture 2"/>
@@ -19458,10 +19542,99 @@
           </a:prstGeom>
         </p:spPr>
       </p:pic>
+      <p:sp>
+        <p:nvSpPr>
+          <p:cNvPr id="2" name="Rectangle 1"/>
+          <p:cNvSpPr/>
+          <p:nvPr/>
+        </p:nvSpPr>
+        <p:spPr>
+          <a:xfrm>
+            <a:off x="8052306" y="2667097"/>
+            <a:ext cx="3097577" cy="1754326"/>
+          </a:xfrm>
+          <a:prstGeom prst="rect">
+            <a:avLst/>
+          </a:prstGeom>
+        </p:spPr>
+        <p:txBody>
+          <a:bodyPr wrap="square">
+            <a:spAutoFit/>
+          </a:bodyPr>
+          <a:lstStyle/>
+          <a:p>
+            <a:r>
+              <a:rPr lang="en-US" sz="3600" dirty="0">
+                <a:solidFill>
+                  <a:schemeClr val="accent4"/>
+                </a:solidFill>
+                <a:latin typeface="Yanone Kaffeesatz Regular" panose="02000000000000000000" pitchFamily="2" charset="0"/>
+              </a:rPr>
+              <a:t>@danielmarbach</a:t>
+            </a:r>
+          </a:p>
+          <a:p>
+            <a:r>
+              <a:rPr lang="en-US" sz="3600" dirty="0">
+                <a:solidFill>
+                  <a:schemeClr val="accent4"/>
+                </a:solidFill>
+                <a:latin typeface="Yanone Kaffeesatz Regular" panose="02000000000000000000" pitchFamily="2" charset="0"/>
+              </a:rPr>
+              <a:t>particular.net/blog</a:t>
+            </a:r>
+          </a:p>
+          <a:p>
+            <a:r>
+              <a:rPr lang="en-US" sz="3600" dirty="0">
+                <a:solidFill>
+                  <a:schemeClr val="accent4"/>
+                </a:solidFill>
+                <a:latin typeface="Yanone Kaffeesatz Regular" panose="02000000000000000000" pitchFamily="2" charset="0"/>
+              </a:rPr>
+              <a:t>planetgeek.ch</a:t>
+            </a:r>
+          </a:p>
+        </p:txBody>
+      </p:sp>
+      <p:sp>
+        <p:nvSpPr>
+          <p:cNvPr id="5" name="Rectangle 4"/>
+          <p:cNvSpPr/>
+          <p:nvPr/>
+        </p:nvSpPr>
+        <p:spPr>
+          <a:xfrm>
+            <a:off x="891348" y="1966905"/>
+            <a:ext cx="5838458" cy="3154710"/>
+          </a:xfrm>
+          <a:prstGeom prst="rect">
+            <a:avLst/>
+          </a:prstGeom>
+        </p:spPr>
+        <p:txBody>
+          <a:bodyPr wrap="none">
+            <a:spAutoFit/>
+          </a:bodyPr>
+          <a:lstStyle/>
+          <a:p>
+            <a:r>
+              <a:rPr lang="en-US" sz="19900" dirty="0">
+                <a:solidFill>
+                  <a:schemeClr val="accent2"/>
+                </a:solidFill>
+                <a:latin typeface="Yanone Kaffeesatz Regular" panose="02000000000000000000" pitchFamily="2" charset="0"/>
+              </a:rPr>
+              <a:t>Thanks</a:t>
+            </a:r>
+            <a:endParaRPr lang="de-CH" sz="2000" dirty="0"/>
+          </a:p>
+        </p:txBody>
+      </p:sp>
     </p:spTree>
     <p:extLst>
       <p:ext uri="{BB962C8B-B14F-4D97-AF65-F5344CB8AC3E}">
-        <p14:creationId xmlns:p14="http://schemas.microsoft.com/office/powerpoint/2010/main" val="3887468163"/>
+        <p14:creationId xmlns:p14="http://schemas.microsoft.com/office/powerpoint/2010/main" val="2540363478"/>
       </p:ext>
     </p:extLst>
   </p:cSld>

</xml_diff>